<commit_message>
add git link in ppt
</commit_message>
<xml_diff>
--- a/factory-design-pattern.pptx
+++ b/factory-design-pattern.pptx
@@ -3201,6 +3201,56 @@
           </a:p>
         </p:txBody>
       </p:sp>
+      <p:sp>
+        <p:nvSpPr>
+          <p:cNvPr id="4" name="TextBox 3"/>
+          <p:cNvSpPr txBox="1"/>
+          <p:nvPr/>
+        </p:nvSpPr>
+        <p:spPr>
+          <a:xfrm>
+            <a:off x="1755345" y="304800"/>
+            <a:ext cx="5559855" cy="369332"/>
+          </a:xfrm>
+          <a:prstGeom prst="rect">
+            <a:avLst/>
+          </a:prstGeom>
+          <a:noFill/>
+        </p:spPr>
+        <p:txBody>
+          <a:bodyPr wrap="none" rtlCol="0">
+            <a:spAutoFit/>
+          </a:bodyPr>
+          <a:lstStyle/>
+          <a:p>
+            <a:r>
+              <a:rPr lang="en-US" dirty="0" err="1">
+                <a:hlinkClick r:id="rId3"/>
+              </a:rPr>
+              <a:t>sawankarn</a:t>
+            </a:r>
+            <a:r>
+              <a:rPr lang="en-US" dirty="0">
+                <a:hlinkClick r:id="rId3"/>
+              </a:rPr>
+              <a:t>/factory-design-pattern-code-</a:t>
+            </a:r>
+            <a:r>
+              <a:rPr lang="en-US" dirty="0" err="1">
+                <a:hlinkClick r:id="rId3"/>
+              </a:rPr>
+              <a:t>ppt</a:t>
+            </a:r>
+            <a:r>
+              <a:rPr lang="en-US" dirty="0">
+                <a:hlinkClick r:id="rId3"/>
+              </a:rPr>
+              <a:t> (github.com)</a:t>
+            </a:r>
+            <a:endParaRPr lang="en-US" dirty="0"/>
+          </a:p>
+        </p:txBody>
+      </p:sp>
     </p:spTree>
     <p:extLst>
       <p:ext uri="{BB962C8B-B14F-4D97-AF65-F5344CB8AC3E}">
@@ -3295,6 +3345,56 @@
           </a:extLst>
         </p:spPr>
       </p:pic>
+      <p:sp>
+        <p:nvSpPr>
+          <p:cNvPr id="3" name="TextBox 2"/>
+          <p:cNvSpPr txBox="1"/>
+          <p:nvPr/>
+        </p:nvSpPr>
+        <p:spPr>
+          <a:xfrm>
+            <a:off x="1755345" y="76200"/>
+            <a:ext cx="5559855" cy="369332"/>
+          </a:xfrm>
+          <a:prstGeom prst="rect">
+            <a:avLst/>
+          </a:prstGeom>
+          <a:noFill/>
+        </p:spPr>
+        <p:txBody>
+          <a:bodyPr wrap="none" rtlCol="0">
+            <a:spAutoFit/>
+          </a:bodyPr>
+          <a:lstStyle/>
+          <a:p>
+            <a:r>
+              <a:rPr lang="en-US" dirty="0" err="1">
+                <a:hlinkClick r:id="rId3"/>
+              </a:rPr>
+              <a:t>sawankarn</a:t>
+            </a:r>
+            <a:r>
+              <a:rPr lang="en-US" dirty="0">
+                <a:hlinkClick r:id="rId3"/>
+              </a:rPr>
+              <a:t>/factory-design-pattern-code-</a:t>
+            </a:r>
+            <a:r>
+              <a:rPr lang="en-US" dirty="0" err="1">
+                <a:hlinkClick r:id="rId3"/>
+              </a:rPr>
+              <a:t>ppt</a:t>
+            </a:r>
+            <a:r>
+              <a:rPr lang="en-US" dirty="0">
+                <a:hlinkClick r:id="rId3"/>
+              </a:rPr>
+              <a:t> (github.com)</a:t>
+            </a:r>
+            <a:endParaRPr lang="en-US" dirty="0"/>
+          </a:p>
+        </p:txBody>
+      </p:sp>
     </p:spTree>
     <p:extLst>
       <p:ext uri="{BB962C8B-B14F-4D97-AF65-F5344CB8AC3E}">
@@ -3389,6 +3489,56 @@
           </a:extLst>
         </p:spPr>
       </p:pic>
+      <p:sp>
+        <p:nvSpPr>
+          <p:cNvPr id="3" name="TextBox 2"/>
+          <p:cNvSpPr txBox="1"/>
+          <p:nvPr/>
+        </p:nvSpPr>
+        <p:spPr>
+          <a:xfrm>
+            <a:off x="1755345" y="304800"/>
+            <a:ext cx="5559855" cy="369332"/>
+          </a:xfrm>
+          <a:prstGeom prst="rect">
+            <a:avLst/>
+          </a:prstGeom>
+          <a:noFill/>
+        </p:spPr>
+        <p:txBody>
+          <a:bodyPr wrap="none" rtlCol="0">
+            <a:spAutoFit/>
+          </a:bodyPr>
+          <a:lstStyle/>
+          <a:p>
+            <a:r>
+              <a:rPr lang="en-US" dirty="0" err="1">
+                <a:hlinkClick r:id="rId3"/>
+              </a:rPr>
+              <a:t>sawankarn</a:t>
+            </a:r>
+            <a:r>
+              <a:rPr lang="en-US" dirty="0">
+                <a:hlinkClick r:id="rId3"/>
+              </a:rPr>
+              <a:t>/factory-design-pattern-code-</a:t>
+            </a:r>
+            <a:r>
+              <a:rPr lang="en-US" dirty="0" err="1">
+                <a:hlinkClick r:id="rId3"/>
+              </a:rPr>
+              <a:t>ppt</a:t>
+            </a:r>
+            <a:r>
+              <a:rPr lang="en-US" dirty="0">
+                <a:hlinkClick r:id="rId3"/>
+              </a:rPr>
+              <a:t> (github.com)</a:t>
+            </a:r>
+            <a:endParaRPr lang="en-US" dirty="0"/>
+          </a:p>
+        </p:txBody>
+      </p:sp>
     </p:spTree>
     <p:extLst>
       <p:ext uri="{BB962C8B-B14F-4D97-AF65-F5344CB8AC3E}">
@@ -3494,6 +3644,56 @@
               <a:t>All code based logic written only for Truck.</a:t>
             </a:r>
             <a:endParaRPr lang="en-US" sz="1600" dirty="0"/>
+          </a:p>
+        </p:txBody>
+      </p:sp>
+      <p:sp>
+        <p:nvSpPr>
+          <p:cNvPr id="4" name="TextBox 3"/>
+          <p:cNvSpPr txBox="1"/>
+          <p:nvPr/>
+        </p:nvSpPr>
+        <p:spPr>
+          <a:xfrm>
+            <a:off x="1755345" y="304800"/>
+            <a:ext cx="5559855" cy="369332"/>
+          </a:xfrm>
+          <a:prstGeom prst="rect">
+            <a:avLst/>
+          </a:prstGeom>
+          <a:noFill/>
+        </p:spPr>
+        <p:txBody>
+          <a:bodyPr wrap="none" rtlCol="0">
+            <a:spAutoFit/>
+          </a:bodyPr>
+          <a:lstStyle/>
+          <a:p>
+            <a:r>
+              <a:rPr lang="en-US" dirty="0" err="1">
+                <a:hlinkClick r:id="rId3"/>
+              </a:rPr>
+              <a:t>sawankarn</a:t>
+            </a:r>
+            <a:r>
+              <a:rPr lang="en-US" dirty="0">
+                <a:hlinkClick r:id="rId3"/>
+              </a:rPr>
+              <a:t>/factory-design-pattern-code-</a:t>
+            </a:r>
+            <a:r>
+              <a:rPr lang="en-US" dirty="0" err="1">
+                <a:hlinkClick r:id="rId3"/>
+              </a:rPr>
+              <a:t>ppt</a:t>
+            </a:r>
+            <a:r>
+              <a:rPr lang="en-US" dirty="0">
+                <a:hlinkClick r:id="rId3"/>
+              </a:rPr>
+              <a:t> (github.com)</a:t>
+            </a:r>
+            <a:endParaRPr lang="en-US" dirty="0"/>
           </a:p>
         </p:txBody>
       </p:sp>
@@ -3708,6 +3908,56 @@
           </a:p>
         </p:txBody>
       </p:sp>
+      <p:sp>
+        <p:nvSpPr>
+          <p:cNvPr id="6" name="TextBox 5"/>
+          <p:cNvSpPr txBox="1"/>
+          <p:nvPr/>
+        </p:nvSpPr>
+        <p:spPr>
+          <a:xfrm>
+            <a:off x="1755345" y="304800"/>
+            <a:ext cx="5559855" cy="369332"/>
+          </a:xfrm>
+          <a:prstGeom prst="rect">
+            <a:avLst/>
+          </a:prstGeom>
+          <a:noFill/>
+        </p:spPr>
+        <p:txBody>
+          <a:bodyPr wrap="none" rtlCol="0">
+            <a:spAutoFit/>
+          </a:bodyPr>
+          <a:lstStyle/>
+          <a:p>
+            <a:r>
+              <a:rPr lang="en-US" dirty="0" err="1">
+                <a:hlinkClick r:id="rId4"/>
+              </a:rPr>
+              <a:t>sawankarn</a:t>
+            </a:r>
+            <a:r>
+              <a:rPr lang="en-US" dirty="0">
+                <a:hlinkClick r:id="rId4"/>
+              </a:rPr>
+              <a:t>/factory-design-pattern-code-</a:t>
+            </a:r>
+            <a:r>
+              <a:rPr lang="en-US" dirty="0" err="1">
+                <a:hlinkClick r:id="rId4"/>
+              </a:rPr>
+              <a:t>ppt</a:t>
+            </a:r>
+            <a:r>
+              <a:rPr lang="en-US" dirty="0">
+                <a:hlinkClick r:id="rId4"/>
+              </a:rPr>
+              <a:t> (github.com)</a:t>
+            </a:r>
+            <a:endParaRPr lang="en-US" dirty="0"/>
+          </a:p>
+        </p:txBody>
+      </p:sp>
     </p:spTree>
     <p:extLst>
       <p:ext uri="{BB962C8B-B14F-4D97-AF65-F5344CB8AC3E}">
@@ -3932,6 +4182,56 @@
           </a:p>
         </p:txBody>
       </p:sp>
+      <p:sp>
+        <p:nvSpPr>
+          <p:cNvPr id="5" name="TextBox 4"/>
+          <p:cNvSpPr txBox="1"/>
+          <p:nvPr/>
+        </p:nvSpPr>
+        <p:spPr>
+          <a:xfrm>
+            <a:off x="1755345" y="304800"/>
+            <a:ext cx="5559855" cy="369332"/>
+          </a:xfrm>
+          <a:prstGeom prst="rect">
+            <a:avLst/>
+          </a:prstGeom>
+          <a:noFill/>
+        </p:spPr>
+        <p:txBody>
+          <a:bodyPr wrap="none" rtlCol="0">
+            <a:spAutoFit/>
+          </a:bodyPr>
+          <a:lstStyle/>
+          <a:p>
+            <a:r>
+              <a:rPr lang="en-US" dirty="0" err="1">
+                <a:hlinkClick r:id="rId4"/>
+              </a:rPr>
+              <a:t>sawankarn</a:t>
+            </a:r>
+            <a:r>
+              <a:rPr lang="en-US" dirty="0">
+                <a:hlinkClick r:id="rId4"/>
+              </a:rPr>
+              <a:t>/factory-design-pattern-code-</a:t>
+            </a:r>
+            <a:r>
+              <a:rPr lang="en-US" dirty="0" err="1">
+                <a:hlinkClick r:id="rId4"/>
+              </a:rPr>
+              <a:t>ppt</a:t>
+            </a:r>
+            <a:r>
+              <a:rPr lang="en-US" dirty="0">
+                <a:hlinkClick r:id="rId4"/>
+              </a:rPr>
+              <a:t> (github.com)</a:t>
+            </a:r>
+            <a:endParaRPr lang="en-US" dirty="0"/>
+          </a:p>
+        </p:txBody>
+      </p:sp>
     </p:spTree>
     <p:extLst>
       <p:ext uri="{BB962C8B-B14F-4D97-AF65-F5344CB8AC3E}">
@@ -4074,6 +4374,56 @@
           </a:extLst>
         </p:spPr>
       </p:pic>
+      <p:sp>
+        <p:nvSpPr>
+          <p:cNvPr id="4" name="TextBox 3"/>
+          <p:cNvSpPr txBox="1"/>
+          <p:nvPr/>
+        </p:nvSpPr>
+        <p:spPr>
+          <a:xfrm>
+            <a:off x="1755345" y="76200"/>
+            <a:ext cx="5559855" cy="369332"/>
+          </a:xfrm>
+          <a:prstGeom prst="rect">
+            <a:avLst/>
+          </a:prstGeom>
+          <a:noFill/>
+        </p:spPr>
+        <p:txBody>
+          <a:bodyPr wrap="none" rtlCol="0">
+            <a:spAutoFit/>
+          </a:bodyPr>
+          <a:lstStyle/>
+          <a:p>
+            <a:r>
+              <a:rPr lang="en-US" dirty="0" err="1">
+                <a:hlinkClick r:id="rId4"/>
+              </a:rPr>
+              <a:t>sawankarn</a:t>
+            </a:r>
+            <a:r>
+              <a:rPr lang="en-US" dirty="0">
+                <a:hlinkClick r:id="rId4"/>
+              </a:rPr>
+              <a:t>/factory-design-pattern-code-</a:t>
+            </a:r>
+            <a:r>
+              <a:rPr lang="en-US" dirty="0" err="1">
+                <a:hlinkClick r:id="rId4"/>
+              </a:rPr>
+              <a:t>ppt</a:t>
+            </a:r>
+            <a:r>
+              <a:rPr lang="en-US" dirty="0">
+                <a:hlinkClick r:id="rId4"/>
+              </a:rPr>
+              <a:t> (github.com)</a:t>
+            </a:r>
+            <a:endParaRPr lang="en-US" dirty="0"/>
+          </a:p>
+        </p:txBody>
+      </p:sp>
     </p:spTree>
     <p:extLst>
       <p:ext uri="{BB962C8B-B14F-4D97-AF65-F5344CB8AC3E}">

</xml_diff>